<commit_message>
slides with Huawei/Cisco network topology updated
</commit_message>
<xml_diff>
--- a/draft-ietf-opsawg-ipfix-srv6-srh-02.pptx
+++ b/draft-ietf-opsawg-ipfix-srv6-srh-02.pptx
@@ -930,7 +930,7 @@
           <a:p>
             <a:fld id="{E5E705E9-673F-4AC4-B29E-A7B26F3B8523}" type="datetimeFigureOut">
               <a:rPr lang="de-CH" smtClean="0"/>
-              <a:t>22.10.2022</a:t>
+              <a:t>29.10.2022</a:t>
             </a:fld>
             <a:endParaRPr lang="de-CH"/>
           </a:p>
@@ -1347,7 +1347,7 @@
           <a:p>
             <a:fld id="{9E9B238C-2335-4007-98C9-471C02CC43B6}" type="datetimeFigureOut">
               <a:rPr lang="de-CH" smtClean="0"/>
-              <a:t>22.10.2022</a:t>
+              <a:t>29.10.2022</a:t>
             </a:fld>
             <a:endParaRPr lang="de-CH"/>
           </a:p>
@@ -1547,7 +1547,7 @@
           <a:p>
             <a:fld id="{9E9B238C-2335-4007-98C9-471C02CC43B6}" type="datetimeFigureOut">
               <a:rPr lang="de-CH" smtClean="0"/>
-              <a:t>22.10.2022</a:t>
+              <a:t>29.10.2022</a:t>
             </a:fld>
             <a:endParaRPr lang="de-CH"/>
           </a:p>
@@ -1757,7 +1757,7 @@
           <a:p>
             <a:fld id="{9E9B238C-2335-4007-98C9-471C02CC43B6}" type="datetimeFigureOut">
               <a:rPr lang="de-CH" smtClean="0"/>
-              <a:t>22.10.2022</a:t>
+              <a:t>29.10.2022</a:t>
             </a:fld>
             <a:endParaRPr lang="de-CH"/>
           </a:p>
@@ -1957,7 +1957,7 @@
           <a:p>
             <a:fld id="{9E9B238C-2335-4007-98C9-471C02CC43B6}" type="datetimeFigureOut">
               <a:rPr lang="de-CH" smtClean="0"/>
-              <a:t>22.10.2022</a:t>
+              <a:t>29.10.2022</a:t>
             </a:fld>
             <a:endParaRPr lang="de-CH"/>
           </a:p>
@@ -2233,7 +2233,7 @@
           <a:p>
             <a:fld id="{9E9B238C-2335-4007-98C9-471C02CC43B6}" type="datetimeFigureOut">
               <a:rPr lang="de-CH" smtClean="0"/>
-              <a:t>22.10.2022</a:t>
+              <a:t>29.10.2022</a:t>
             </a:fld>
             <a:endParaRPr lang="de-CH"/>
           </a:p>
@@ -2501,7 +2501,7 @@
           <a:p>
             <a:fld id="{9E9B238C-2335-4007-98C9-471C02CC43B6}" type="datetimeFigureOut">
               <a:rPr lang="de-CH" smtClean="0"/>
-              <a:t>22.10.2022</a:t>
+              <a:t>29.10.2022</a:t>
             </a:fld>
             <a:endParaRPr lang="de-CH"/>
           </a:p>
@@ -2916,7 +2916,7 @@
           <a:p>
             <a:fld id="{9E9B238C-2335-4007-98C9-471C02CC43B6}" type="datetimeFigureOut">
               <a:rPr lang="de-CH" smtClean="0"/>
-              <a:t>22.10.2022</a:t>
+              <a:t>29.10.2022</a:t>
             </a:fld>
             <a:endParaRPr lang="de-CH"/>
           </a:p>
@@ -3058,7 +3058,7 @@
           <a:p>
             <a:fld id="{9E9B238C-2335-4007-98C9-471C02CC43B6}" type="datetimeFigureOut">
               <a:rPr lang="de-CH" smtClean="0"/>
-              <a:t>22.10.2022</a:t>
+              <a:t>29.10.2022</a:t>
             </a:fld>
             <a:endParaRPr lang="de-CH"/>
           </a:p>
@@ -3171,7 +3171,7 @@
           <a:p>
             <a:fld id="{9E9B238C-2335-4007-98C9-471C02CC43B6}" type="datetimeFigureOut">
               <a:rPr lang="de-CH" smtClean="0"/>
-              <a:t>22.10.2022</a:t>
+              <a:t>29.10.2022</a:t>
             </a:fld>
             <a:endParaRPr lang="de-CH"/>
           </a:p>
@@ -3484,7 +3484,7 @@
           <a:p>
             <a:fld id="{9E9B238C-2335-4007-98C9-471C02CC43B6}" type="datetimeFigureOut">
               <a:rPr lang="de-CH" smtClean="0"/>
-              <a:t>22.10.2022</a:t>
+              <a:t>29.10.2022</a:t>
             </a:fld>
             <a:endParaRPr lang="de-CH"/>
           </a:p>
@@ -3773,7 +3773,7 @@
           <a:p>
             <a:fld id="{9E9B238C-2335-4007-98C9-471C02CC43B6}" type="datetimeFigureOut">
               <a:rPr lang="de-CH" smtClean="0"/>
-              <a:t>22.10.2022</a:t>
+              <a:t>29.10.2022</a:t>
             </a:fld>
             <a:endParaRPr lang="de-CH"/>
           </a:p>
@@ -4016,7 +4016,7 @@
           <a:p>
             <a:fld id="{9E9B238C-2335-4007-98C9-471C02CC43B6}" type="datetimeFigureOut">
               <a:rPr lang="de-CH" smtClean="0"/>
-              <a:t>22.10.2022</a:t>
+              <a:t>29.10.2022</a:t>
             </a:fld>
             <a:endParaRPr lang="de-CH"/>
           </a:p>
@@ -7016,8 +7016,8 @@
         </p:nvSpPr>
         <p:spPr>
           <a:xfrm>
-            <a:off x="838200" y="5498432"/>
-            <a:ext cx="8161421" cy="1085162"/>
+            <a:off x="9523563" y="1940863"/>
+            <a:ext cx="2084238" cy="4545688"/>
           </a:xfrm>
         </p:spPr>
         <p:txBody>
@@ -7035,8 +7035,8 @@
               </a:spcBef>
             </a:pPr>
             <a:r>
-              <a:rPr lang="en-US" sz="1800" dirty="0"/>
-              <a:t>Describe lab topology.</a:t>
+              <a:rPr lang="en-US" sz="1700" dirty="0"/>
+              <a:t>SRv6 network topology with two vendors and IPFIX data pipeline.</a:t>
             </a:r>
           </a:p>
           <a:p>
@@ -7049,10 +7049,24 @@
               </a:spcBef>
             </a:pPr>
             <a:r>
-              <a:rPr lang="en-US" sz="1800" dirty="0"/>
-              <a:t>Describe where source code is available. Current limitations and next steps.</a:t>
-            </a:r>
-            <a:endParaRPr lang="en-US" sz="1800" b="1" dirty="0"/>
+              <a:rPr lang="en-US" sz="1700" dirty="0"/>
+              <a:t>Huawei with four P and two PE nodes exposing SRH provider data-plane as described in draft-ietf-opsawg-ipfix-srv6-srh. </a:t>
+            </a:r>
+          </a:p>
+          <a:p>
+            <a:pPr>
+              <a:lnSpc>
+                <a:spcPct val="100000"/>
+              </a:lnSpc>
+              <a:spcBef>
+                <a:spcPts val="600"/>
+              </a:spcBef>
+            </a:pPr>
+            <a:r>
+              <a:rPr lang="en-US" sz="1700" dirty="0"/>
+              <a:t>Cisco with two PE nodes exposing customer data-plane.</a:t>
+            </a:r>
+            <a:endParaRPr lang="en-US" sz="1700" b="1" dirty="0"/>
           </a:p>
         </p:txBody>
       </p:sp>
@@ -7090,6 +7104,36 @@
           </a:p>
         </p:txBody>
       </p:sp>
+      <p:pic>
+        <p:nvPicPr>
+          <p:cNvPr id="5" name="Picture 4">
+            <a:extLst>
+              <a:ext uri="{FF2B5EF4-FFF2-40B4-BE49-F238E27FC236}">
+                <a16:creationId xmlns:a16="http://schemas.microsoft.com/office/drawing/2014/main" id="{AAC90122-FCD8-4152-AA68-1C1ECF0821DD}"/>
+              </a:ext>
+            </a:extLst>
+          </p:cNvPr>
+          <p:cNvPicPr>
+            <a:picLocks noChangeAspect="1"/>
+          </p:cNvPicPr>
+          <p:nvPr/>
+        </p:nvPicPr>
+        <p:blipFill>
+          <a:blip r:embed="rId2"/>
+          <a:stretch>
+            <a:fillRect/>
+          </a:stretch>
+        </p:blipFill>
+        <p:spPr>
+          <a:xfrm>
+            <a:off x="430535" y="1690688"/>
+            <a:ext cx="8965677" cy="4898900"/>
+          </a:xfrm>
+          <a:prstGeom prst="rect">
+            <a:avLst/>
+          </a:prstGeom>
+        </p:spPr>
+      </p:pic>
     </p:spTree>
     <p:extLst>
       <p:ext uri="{BB962C8B-B14F-4D97-AF65-F5344CB8AC3E}">

</xml_diff>